<commit_message>
day 31 content updated
</commit_message>
<xml_diff>
--- a/Day30/DockerAndKubernetes_Training-Day30.pptx
+++ b/Day30/DockerAndKubernetes_Training-Day30.pptx
@@ -201,7 +201,7 @@
           <a:p>
             <a:fld id="{B09F413D-6E72-4B8A-80ED-A580F7C91B71}" type="datetimeFigureOut">
               <a:rPr lang="en-IN" smtClean="0"/>
-              <a:t>14-05-2023</a:t>
+              <a:t>15-05-2023</a:t>
             </a:fld>
             <a:endParaRPr lang="en-IN"/>
           </a:p>
@@ -804,7 +804,7 @@
           <a:p>
             <a:fld id="{12E8600E-B0EE-4521-BF40-4B72FBA06775}" type="datetimeFigureOut">
               <a:rPr lang="en-IN" smtClean="0"/>
-              <a:t>14-05-2023</a:t>
+              <a:t>15-05-2023</a:t>
             </a:fld>
             <a:endParaRPr lang="en-IN"/>
           </a:p>
@@ -1893,7 +1893,7 @@
             <a:fld id="{49F3E739-D457-46E5-B626-C9B182A007EE}" type="datetimeFigureOut">
               <a:rPr lang="en-US" smtClean="0"/>
               <a:pPr/>
-              <a:t>5/14/2023</a:t>
+              <a:t>5/15/2023</a:t>
             </a:fld>
             <a:endParaRPr lang="en-US"/>
           </a:p>
@@ -2875,7 +2875,7 @@
             <a:fld id="{49F3E739-D457-46E5-B626-C9B182A007EE}" type="datetimeFigureOut">
               <a:rPr lang="en-US" smtClean="0"/>
               <a:pPr/>
-              <a:t>5/14/2023</a:t>
+              <a:t>5/15/2023</a:t>
             </a:fld>
             <a:endParaRPr lang="en-US"/>
           </a:p>
@@ -4011,7 +4011,7 @@
             <a:fld id="{49F3E739-D457-46E5-B626-C9B182A007EE}" type="datetimeFigureOut">
               <a:rPr lang="en-US" smtClean="0"/>
               <a:pPr/>
-              <a:t>5/14/2023</a:t>
+              <a:t>5/15/2023</a:t>
             </a:fld>
             <a:endParaRPr lang="en-US"/>
           </a:p>
@@ -5046,7 +5046,7 @@
             <a:fld id="{49F3E739-D457-46E5-B626-C9B182A007EE}" type="datetimeFigureOut">
               <a:rPr lang="en-US" smtClean="0"/>
               <a:pPr/>
-              <a:t>5/14/2023</a:t>
+              <a:t>5/15/2023</a:t>
             </a:fld>
             <a:endParaRPr lang="en-US"/>
           </a:p>
@@ -5708,7 +5708,7 @@
             <a:fld id="{49F3E739-D457-46E5-B626-C9B182A007EE}" type="datetimeFigureOut">
               <a:rPr lang="en-US" smtClean="0"/>
               <a:pPr/>
-              <a:t>5/14/2023</a:t>
+              <a:t>5/15/2023</a:t>
             </a:fld>
             <a:endParaRPr lang="en-US"/>
           </a:p>
@@ -6571,7 +6571,7 @@
             <a:fld id="{49F3E739-D457-46E5-B626-C9B182A007EE}" type="datetimeFigureOut">
               <a:rPr lang="en-US" smtClean="0"/>
               <a:pPr/>
-              <a:t>5/14/2023</a:t>
+              <a:t>5/15/2023</a:t>
             </a:fld>
             <a:endParaRPr lang="en-US"/>
           </a:p>
@@ -6762,7 +6762,7 @@
           <a:p>
             <a:fld id="{12E8600E-B0EE-4521-BF40-4B72FBA06775}" type="datetimeFigureOut">
               <a:rPr lang="en-IN" smtClean="0"/>
-              <a:t>14-05-2023</a:t>
+              <a:t>15-05-2023</a:t>
             </a:fld>
             <a:endParaRPr lang="en-IN"/>
           </a:p>
@@ -7734,7 +7734,7 @@
           <a:p>
             <a:fld id="{12E8600E-B0EE-4521-BF40-4B72FBA06775}" type="datetimeFigureOut">
               <a:rPr lang="en-IN" smtClean="0"/>
-              <a:t>14-05-2023</a:t>
+              <a:t>15-05-2023</a:t>
             </a:fld>
             <a:endParaRPr lang="en-IN"/>
           </a:p>
@@ -7945,7 +7945,7 @@
           <a:p>
             <a:fld id="{12E8600E-B0EE-4521-BF40-4B72FBA06775}" type="datetimeFigureOut">
               <a:rPr lang="en-IN" smtClean="0"/>
-              <a:t>14-05-2023</a:t>
+              <a:t>15-05-2023</a:t>
             </a:fld>
             <a:endParaRPr lang="en-IN"/>
           </a:p>
@@ -8979,7 +8979,7 @@
           <a:p>
             <a:fld id="{12E8600E-B0EE-4521-BF40-4B72FBA06775}" type="datetimeFigureOut">
               <a:rPr lang="en-IN" smtClean="0"/>
-              <a:t>14-05-2023</a:t>
+              <a:t>15-05-2023</a:t>
             </a:fld>
             <a:endParaRPr lang="en-IN"/>
           </a:p>
@@ -9251,7 +9251,7 @@
           <a:p>
             <a:fld id="{12E8600E-B0EE-4521-BF40-4B72FBA06775}" type="datetimeFigureOut">
               <a:rPr lang="en-IN" smtClean="0"/>
-              <a:t>14-05-2023</a:t>
+              <a:t>15-05-2023</a:t>
             </a:fld>
             <a:endParaRPr lang="en-IN"/>
           </a:p>
@@ -9662,7 +9662,7 @@
             <a:fld id="{49F3E739-D457-46E5-B626-C9B182A007EE}" type="datetimeFigureOut">
               <a:rPr lang="en-US" smtClean="0"/>
               <a:pPr/>
-              <a:t>5/14/2023</a:t>
+              <a:t>5/15/2023</a:t>
             </a:fld>
             <a:endParaRPr lang="en-US"/>
           </a:p>
@@ -9790,7 +9790,7 @@
           <a:p>
             <a:fld id="{12E8600E-B0EE-4521-BF40-4B72FBA06775}" type="datetimeFigureOut">
               <a:rPr lang="en-IN" smtClean="0"/>
-              <a:t>14-05-2023</a:t>
+              <a:t>15-05-2023</a:t>
             </a:fld>
             <a:endParaRPr lang="en-IN"/>
           </a:p>
@@ -9885,7 +9885,7 @@
           <a:p>
             <a:fld id="{12E8600E-B0EE-4521-BF40-4B72FBA06775}" type="datetimeFigureOut">
               <a:rPr lang="en-IN" smtClean="0"/>
-              <a:t>14-05-2023</a:t>
+              <a:t>15-05-2023</a:t>
             </a:fld>
             <a:endParaRPr lang="en-IN"/>
           </a:p>
@@ -10966,7 +10966,7 @@
           <a:p>
             <a:fld id="{12E8600E-B0EE-4521-BF40-4B72FBA06775}" type="datetimeFigureOut">
               <a:rPr lang="en-IN" smtClean="0"/>
-              <a:t>14-05-2023</a:t>
+              <a:t>15-05-2023</a:t>
             </a:fld>
             <a:endParaRPr lang="en-IN"/>
           </a:p>
@@ -12075,7 +12075,7 @@
             <a:fld id="{49F3E739-D457-46E5-B626-C9B182A007EE}" type="datetimeFigureOut">
               <a:rPr lang="en-US" smtClean="0"/>
               <a:pPr/>
-              <a:t>5/14/2023</a:t>
+              <a:t>5/15/2023</a:t>
             </a:fld>
             <a:endParaRPr lang="en-US"/>
           </a:p>
@@ -13074,7 +13074,7 @@
             <a:fld id="{49F3E739-D457-46E5-B626-C9B182A007EE}" type="datetimeFigureOut">
               <a:rPr lang="en-US" smtClean="0"/>
               <a:pPr/>
-              <a:t>5/14/2023</a:t>
+              <a:t>5/15/2023</a:t>
             </a:fld>
             <a:endParaRPr lang="en-US"/>
           </a:p>
@@ -14051,29 +14051,12 @@
           <a:p>
             <a:r>
               <a:rPr lang="en-US" dirty="0"/>
-              <a:t>Daemon set Demo</a:t>
+              <a:t>Daemon </a:t>
             </a:r>
-          </a:p>
-          <a:p>
-            <a:r>
-              <a:rPr lang="en-US" dirty="0"/>
-              <a:t>Stateful set understanding and use-cases</a:t>
-            </a:r>
-          </a:p>
-          <a:p>
             <a:r>
               <a:rPr lang="en-US"/>
-              <a:t>Stateful set </a:t>
+              <a:t>set Demo</a:t>
             </a:r>
-            <a:r>
-              <a:rPr lang="en-US" dirty="0"/>
-              <a:t>Demo</a:t>
-            </a:r>
-          </a:p>
-          <a:p>
-            <a:pPr marL="1371600" lvl="3" indent="0">
-              <a:buNone/>
-            </a:pPr>
             <a:endParaRPr lang="en-US" dirty="0"/>
           </a:p>
           <a:p>

</xml_diff>